<commit_message>
add two screenshots to presentation
</commit_message>
<xml_diff>
--- a/Mountaineer.pptx
+++ b/Mountaineer.pptx
@@ -17,9 +17,11 @@
     <p:sldId id="263" r:id="rId11"/>
     <p:sldId id="264" r:id="rId12"/>
     <p:sldId id="265" r:id="rId13"/>
-    <p:sldId id="266" r:id="rId14"/>
-    <p:sldId id="269" r:id="rId15"/>
-    <p:sldId id="270" r:id="rId16"/>
+    <p:sldId id="272" r:id="rId14"/>
+    <p:sldId id="266" r:id="rId15"/>
+    <p:sldId id="269" r:id="rId16"/>
+    <p:sldId id="270" r:id="rId17"/>
+    <p:sldId id="271" r:id="rId18"/>
   </p:sldIdLst>
   <p:sldSz cx="12192000" cy="6858000"/>
   <p:notesSz cx="6858000" cy="9144000"/>
@@ -297,7 +299,7 @@
           <a:p>
             <a:fld id="{ACE3B52F-493B-4126-A797-2AC36596430B}" type="datetimeFigureOut">
               <a:rPr lang="de-AT" smtClean="0"/>
-              <a:t>20.11.2017</a:t>
+              <a:t>21.11.2017</a:t>
             </a:fld>
             <a:endParaRPr lang="de-AT"/>
           </a:p>
@@ -497,7 +499,7 @@
           <a:p>
             <a:fld id="{ACE3B52F-493B-4126-A797-2AC36596430B}" type="datetimeFigureOut">
               <a:rPr lang="de-AT" smtClean="0"/>
-              <a:t>20.11.2017</a:t>
+              <a:t>21.11.2017</a:t>
             </a:fld>
             <a:endParaRPr lang="de-AT"/>
           </a:p>
@@ -707,7 +709,7 @@
           <a:p>
             <a:fld id="{ACE3B52F-493B-4126-A797-2AC36596430B}" type="datetimeFigureOut">
               <a:rPr lang="de-AT" smtClean="0"/>
-              <a:t>20.11.2017</a:t>
+              <a:t>21.11.2017</a:t>
             </a:fld>
             <a:endParaRPr lang="de-AT"/>
           </a:p>
@@ -948,7 +950,7 @@
           <a:p>
             <a:fld id="{ACE3B52F-493B-4126-A797-2AC36596430B}" type="datetimeFigureOut">
               <a:rPr lang="de-AT" smtClean="0"/>
-              <a:t>20.11.2017</a:t>
+              <a:t>21.11.2017</a:t>
             </a:fld>
             <a:endParaRPr lang="de-AT"/>
           </a:p>
@@ -1224,7 +1226,7 @@
           <a:p>
             <a:fld id="{ACE3B52F-493B-4126-A797-2AC36596430B}" type="datetimeFigureOut">
               <a:rPr lang="de-AT" smtClean="0"/>
-              <a:t>20.11.2017</a:t>
+              <a:t>21.11.2017</a:t>
             </a:fld>
             <a:endParaRPr lang="de-AT"/>
           </a:p>
@@ -1492,7 +1494,7 @@
           <a:p>
             <a:fld id="{ACE3B52F-493B-4126-A797-2AC36596430B}" type="datetimeFigureOut">
               <a:rPr lang="de-AT" smtClean="0"/>
-              <a:t>20.11.2017</a:t>
+              <a:t>21.11.2017</a:t>
             </a:fld>
             <a:endParaRPr lang="de-AT"/>
           </a:p>
@@ -1907,7 +1909,7 @@
           <a:p>
             <a:fld id="{ACE3B52F-493B-4126-A797-2AC36596430B}" type="datetimeFigureOut">
               <a:rPr lang="de-AT" smtClean="0"/>
-              <a:t>20.11.2017</a:t>
+              <a:t>21.11.2017</a:t>
             </a:fld>
             <a:endParaRPr lang="de-AT"/>
           </a:p>
@@ -2049,7 +2051,7 @@
           <a:p>
             <a:fld id="{ACE3B52F-493B-4126-A797-2AC36596430B}" type="datetimeFigureOut">
               <a:rPr lang="de-AT" smtClean="0"/>
-              <a:t>20.11.2017</a:t>
+              <a:t>21.11.2017</a:t>
             </a:fld>
             <a:endParaRPr lang="de-AT"/>
           </a:p>
@@ -2162,7 +2164,7 @@
           <a:p>
             <a:fld id="{ACE3B52F-493B-4126-A797-2AC36596430B}" type="datetimeFigureOut">
               <a:rPr lang="de-AT" smtClean="0"/>
-              <a:t>20.11.2017</a:t>
+              <a:t>21.11.2017</a:t>
             </a:fld>
             <a:endParaRPr lang="de-AT"/>
           </a:p>
@@ -2475,7 +2477,7 @@
           <a:p>
             <a:fld id="{ACE3B52F-493B-4126-A797-2AC36596430B}" type="datetimeFigureOut">
               <a:rPr lang="de-AT" smtClean="0"/>
-              <a:t>20.11.2017</a:t>
+              <a:t>21.11.2017</a:t>
             </a:fld>
             <a:endParaRPr lang="de-AT"/>
           </a:p>
@@ -2764,7 +2766,7 @@
           <a:p>
             <a:fld id="{ACE3B52F-493B-4126-A797-2AC36596430B}" type="datetimeFigureOut">
               <a:rPr lang="de-AT" smtClean="0"/>
-              <a:t>20.11.2017</a:t>
+              <a:t>21.11.2017</a:t>
             </a:fld>
             <a:endParaRPr lang="de-AT"/>
           </a:p>
@@ -3007,7 +3009,7 @@
           <a:p>
             <a:fld id="{ACE3B52F-493B-4126-A797-2AC36596430B}" type="datetimeFigureOut">
               <a:rPr lang="de-AT" smtClean="0"/>
-              <a:t>20.11.2017</a:t>
+              <a:t>21.11.2017</a:t>
             </a:fld>
             <a:endParaRPr lang="de-AT"/>
           </a:p>
@@ -4416,6 +4418,109 @@
           <p:cNvPr id="2" name="Titel 1">
             <a:extLst>
               <a:ext uri="{FF2B5EF4-FFF2-40B4-BE49-F238E27FC236}">
+                <a16:creationId xmlns:a16="http://schemas.microsoft.com/office/drawing/2014/main" id="{D751572B-C7B7-4673-B089-8CF2BCC11B4B}"/>
+              </a:ext>
+            </a:extLst>
+          </p:cNvPr>
+          <p:cNvSpPr>
+            <a:spLocks noGrp="1"/>
+          </p:cNvSpPr>
+          <p:nvPr>
+            <p:ph type="title"/>
+          </p:nvPr>
+        </p:nvSpPr>
+        <p:spPr/>
+        <p:txBody>
+          <a:bodyPr/>
+          <a:lstStyle/>
+          <a:p>
+            <a:endParaRPr lang="de-AT"/>
+          </a:p>
+        </p:txBody>
+      </p:sp>
+      <p:pic>
+        <p:nvPicPr>
+          <p:cNvPr id="5" name="Inhaltsplatzhalter 4">
+            <a:extLst>
+              <a:ext uri="{FF2B5EF4-FFF2-40B4-BE49-F238E27FC236}">
+                <a16:creationId xmlns:a16="http://schemas.microsoft.com/office/drawing/2014/main" id="{F31A6ABD-181B-479F-85F4-04B67793D18C}"/>
+              </a:ext>
+            </a:extLst>
+          </p:cNvPr>
+          <p:cNvPicPr>
+            <a:picLocks noGrp="1" noChangeAspect="1"/>
+          </p:cNvPicPr>
+          <p:nvPr>
+            <p:ph idx="1"/>
+          </p:nvPr>
+        </p:nvPicPr>
+        <p:blipFill>
+          <a:blip r:embed="rId2">
+            <a:extLst>
+              <a:ext uri="{28A0092B-C50C-407E-A947-70E740481C1C}">
+                <a14:useLocalDpi xmlns:a14="http://schemas.microsoft.com/office/drawing/2010/main" val="0"/>
+              </a:ext>
+            </a:extLst>
+          </a:blip>
+          <a:stretch>
+            <a:fillRect/>
+          </a:stretch>
+        </p:blipFill>
+        <p:spPr>
+          <a:xfrm>
+            <a:off x="5937782" y="3429000"/>
+            <a:ext cx="4543102" cy="2425233"/>
+          </a:xfrm>
+          <a:prstGeom prst="rect">
+            <a:avLst/>
+          </a:prstGeom>
+          <a:ln>
+            <a:noFill/>
+          </a:ln>
+          <a:effectLst>
+            <a:outerShdw blurRad="292100" dist="139700" dir="2700000" algn="tl" rotWithShape="0">
+              <a:srgbClr val="333333">
+                <a:alpha val="65000"/>
+              </a:srgbClr>
+            </a:outerShdw>
+          </a:effectLst>
+        </p:spPr>
+      </p:pic>
+    </p:spTree>
+    <p:extLst>
+      <p:ext uri="{BB962C8B-B14F-4D97-AF65-F5344CB8AC3E}">
+        <p14:creationId xmlns:p14="http://schemas.microsoft.com/office/powerpoint/2010/main" val="2639763750"/>
+      </p:ext>
+    </p:extLst>
+  </p:cSld>
+  <p:clrMapOvr>
+    <a:masterClrMapping/>
+  </p:clrMapOvr>
+</p:sld>
+</file>
+
+<file path=ppt/slides/slide14.xml><?xml version="1.0" encoding="utf-8"?>
+<p:sld xmlns:a="http://schemas.openxmlformats.org/drawingml/2006/main" xmlns:r="http://schemas.openxmlformats.org/officeDocument/2006/relationships" xmlns:p="http://schemas.openxmlformats.org/presentationml/2006/main">
+  <p:cSld>
+    <p:spTree>
+      <p:nvGrpSpPr>
+        <p:cNvPr id="1" name=""/>
+        <p:cNvGrpSpPr/>
+        <p:nvPr/>
+      </p:nvGrpSpPr>
+      <p:grpSpPr>
+        <a:xfrm>
+          <a:off x="0" y="0"/>
+          <a:ext cx="0" cy="0"/>
+          <a:chOff x="0" y="0"/>
+          <a:chExt cx="0" cy="0"/>
+        </a:xfrm>
+      </p:grpSpPr>
+      <p:sp>
+        <p:nvSpPr>
+          <p:cNvPr id="2" name="Titel 1">
+            <a:extLst>
+              <a:ext uri="{FF2B5EF4-FFF2-40B4-BE49-F238E27FC236}">
                 <a16:creationId xmlns:a16="http://schemas.microsoft.com/office/drawing/2014/main" id="{3BC381C4-762F-49EC-A88E-C3D5DDA8A4B2}"/>
               </a:ext>
             </a:extLst>
@@ -4502,7 +4607,7 @@
 </p:sld>
 </file>
 
-<file path=ppt/slides/slide14.xml><?xml version="1.0" encoding="utf-8"?>
+<file path=ppt/slides/slide15.xml><?xml version="1.0" encoding="utf-8"?>
 <p:sld xmlns:a="http://schemas.openxmlformats.org/drawingml/2006/main" xmlns:r="http://schemas.openxmlformats.org/officeDocument/2006/relationships" xmlns:p="http://schemas.openxmlformats.org/presentationml/2006/main">
   <p:cSld>
     <p:bg>
@@ -4590,7 +4695,7 @@
 </p:sld>
 </file>
 
-<file path=ppt/slides/slide15.xml><?xml version="1.0" encoding="utf-8"?>
+<file path=ppt/slides/slide16.xml><?xml version="1.0" encoding="utf-8"?>
 <p:sld xmlns:a="http://schemas.openxmlformats.org/drawingml/2006/main" xmlns:r="http://schemas.openxmlformats.org/officeDocument/2006/relationships" xmlns:p="http://schemas.openxmlformats.org/presentationml/2006/main">
   <p:cSld>
     <p:spTree>
@@ -5215,6 +5320,109 @@
     <p:extLst>
       <p:ext uri="{BB962C8B-B14F-4D97-AF65-F5344CB8AC3E}">
         <p14:creationId xmlns:p14="http://schemas.microsoft.com/office/powerpoint/2010/main" val="3910073030"/>
+      </p:ext>
+    </p:extLst>
+  </p:cSld>
+  <p:clrMapOvr>
+    <a:masterClrMapping/>
+  </p:clrMapOvr>
+</p:sld>
+</file>
+
+<file path=ppt/slides/slide17.xml><?xml version="1.0" encoding="utf-8"?>
+<p:sld xmlns:a="http://schemas.openxmlformats.org/drawingml/2006/main" xmlns:r="http://schemas.openxmlformats.org/officeDocument/2006/relationships" xmlns:p="http://schemas.openxmlformats.org/presentationml/2006/main">
+  <p:cSld>
+    <p:spTree>
+      <p:nvGrpSpPr>
+        <p:cNvPr id="1" name=""/>
+        <p:cNvGrpSpPr/>
+        <p:nvPr/>
+      </p:nvGrpSpPr>
+      <p:grpSpPr>
+        <a:xfrm>
+          <a:off x="0" y="0"/>
+          <a:ext cx="0" cy="0"/>
+          <a:chOff x="0" y="0"/>
+          <a:chExt cx="0" cy="0"/>
+        </a:xfrm>
+      </p:grpSpPr>
+      <p:sp>
+        <p:nvSpPr>
+          <p:cNvPr id="2" name="Titel 1">
+            <a:extLst>
+              <a:ext uri="{FF2B5EF4-FFF2-40B4-BE49-F238E27FC236}">
+                <a16:creationId xmlns:a16="http://schemas.microsoft.com/office/drawing/2014/main" id="{2F8A9E85-0AAB-4835-A6C9-3C90173BFBE0}"/>
+              </a:ext>
+            </a:extLst>
+          </p:cNvPr>
+          <p:cNvSpPr>
+            <a:spLocks noGrp="1"/>
+          </p:cNvSpPr>
+          <p:nvPr>
+            <p:ph type="title"/>
+          </p:nvPr>
+        </p:nvSpPr>
+        <p:spPr/>
+        <p:txBody>
+          <a:bodyPr/>
+          <a:lstStyle/>
+          <a:p>
+            <a:endParaRPr lang="de-AT"/>
+          </a:p>
+        </p:txBody>
+      </p:sp>
+      <p:pic>
+        <p:nvPicPr>
+          <p:cNvPr id="5" name="Inhaltsplatzhalter 4">
+            <a:extLst>
+              <a:ext uri="{FF2B5EF4-FFF2-40B4-BE49-F238E27FC236}">
+                <a16:creationId xmlns:a16="http://schemas.microsoft.com/office/drawing/2014/main" id="{F629C541-A0FF-435B-8933-EFD11BC612AC}"/>
+              </a:ext>
+            </a:extLst>
+          </p:cNvPr>
+          <p:cNvPicPr>
+            <a:picLocks noGrp="1" noChangeAspect="1"/>
+          </p:cNvPicPr>
+          <p:nvPr>
+            <p:ph idx="1"/>
+          </p:nvPr>
+        </p:nvPicPr>
+        <p:blipFill>
+          <a:blip r:embed="rId2">
+            <a:extLst>
+              <a:ext uri="{28A0092B-C50C-407E-A947-70E740481C1C}">
+                <a14:useLocalDpi xmlns:a14="http://schemas.microsoft.com/office/drawing/2010/main" val="0"/>
+              </a:ext>
+            </a:extLst>
+          </a:blip>
+          <a:stretch>
+            <a:fillRect/>
+          </a:stretch>
+        </p:blipFill>
+        <p:spPr>
+          <a:xfrm>
+            <a:off x="1611797" y="1825625"/>
+            <a:ext cx="8968406" cy="4351338"/>
+          </a:xfrm>
+          <a:prstGeom prst="rect">
+            <a:avLst/>
+          </a:prstGeom>
+          <a:ln>
+            <a:noFill/>
+          </a:ln>
+          <a:effectLst>
+            <a:outerShdw blurRad="292100" dist="139700" dir="2700000" algn="tl" rotWithShape="0">
+              <a:srgbClr val="333333">
+                <a:alpha val="65000"/>
+              </a:srgbClr>
+            </a:outerShdw>
+          </a:effectLst>
+        </p:spPr>
+      </p:pic>
+    </p:spTree>
+    <p:extLst>
+      <p:ext uri="{BB962C8B-B14F-4D97-AF65-F5344CB8AC3E}">
+        <p14:creationId xmlns:p14="http://schemas.microsoft.com/office/powerpoint/2010/main" val="1847570275"/>
       </p:ext>
     </p:extLst>
   </p:cSld>

</xml_diff>

<commit_message>
add screenshots to presentation
</commit_message>
<xml_diff>
--- a/Mountaineer.pptx
+++ b/Mountaineer.pptx
@@ -296,7 +296,7 @@
           <a:p>
             <a:fld id="{ACE3B52F-493B-4126-A797-2AC36596430B}" type="datetimeFigureOut">
               <a:rPr lang="de-AT" smtClean="0"/>
-              <a:t>21.11.2017</a:t>
+              <a:t>22.11.2017</a:t>
             </a:fld>
             <a:endParaRPr lang="de-AT"/>
           </a:p>
@@ -496,7 +496,7 @@
           <a:p>
             <a:fld id="{ACE3B52F-493B-4126-A797-2AC36596430B}" type="datetimeFigureOut">
               <a:rPr lang="de-AT" smtClean="0"/>
-              <a:t>21.11.2017</a:t>
+              <a:t>22.11.2017</a:t>
             </a:fld>
             <a:endParaRPr lang="de-AT"/>
           </a:p>
@@ -706,7 +706,7 @@
           <a:p>
             <a:fld id="{ACE3B52F-493B-4126-A797-2AC36596430B}" type="datetimeFigureOut">
               <a:rPr lang="de-AT" smtClean="0"/>
-              <a:t>21.11.2017</a:t>
+              <a:t>22.11.2017</a:t>
             </a:fld>
             <a:endParaRPr lang="de-AT"/>
           </a:p>
@@ -947,7 +947,7 @@
           <a:p>
             <a:fld id="{ACE3B52F-493B-4126-A797-2AC36596430B}" type="datetimeFigureOut">
               <a:rPr lang="de-AT" smtClean="0"/>
-              <a:t>21.11.2017</a:t>
+              <a:t>22.11.2017</a:t>
             </a:fld>
             <a:endParaRPr lang="de-AT"/>
           </a:p>
@@ -1223,7 +1223,7 @@
           <a:p>
             <a:fld id="{ACE3B52F-493B-4126-A797-2AC36596430B}" type="datetimeFigureOut">
               <a:rPr lang="de-AT" smtClean="0"/>
-              <a:t>21.11.2017</a:t>
+              <a:t>22.11.2017</a:t>
             </a:fld>
             <a:endParaRPr lang="de-AT"/>
           </a:p>
@@ -1491,7 +1491,7 @@
           <a:p>
             <a:fld id="{ACE3B52F-493B-4126-A797-2AC36596430B}" type="datetimeFigureOut">
               <a:rPr lang="de-AT" smtClean="0"/>
-              <a:t>21.11.2017</a:t>
+              <a:t>22.11.2017</a:t>
             </a:fld>
             <a:endParaRPr lang="de-AT"/>
           </a:p>
@@ -1906,7 +1906,7 @@
           <a:p>
             <a:fld id="{ACE3B52F-493B-4126-A797-2AC36596430B}" type="datetimeFigureOut">
               <a:rPr lang="de-AT" smtClean="0"/>
-              <a:t>21.11.2017</a:t>
+              <a:t>22.11.2017</a:t>
             </a:fld>
             <a:endParaRPr lang="de-AT"/>
           </a:p>
@@ -2048,7 +2048,7 @@
           <a:p>
             <a:fld id="{ACE3B52F-493B-4126-A797-2AC36596430B}" type="datetimeFigureOut">
               <a:rPr lang="de-AT" smtClean="0"/>
-              <a:t>21.11.2017</a:t>
+              <a:t>22.11.2017</a:t>
             </a:fld>
             <a:endParaRPr lang="de-AT"/>
           </a:p>
@@ -2161,7 +2161,7 @@
           <a:p>
             <a:fld id="{ACE3B52F-493B-4126-A797-2AC36596430B}" type="datetimeFigureOut">
               <a:rPr lang="de-AT" smtClean="0"/>
-              <a:t>21.11.2017</a:t>
+              <a:t>22.11.2017</a:t>
             </a:fld>
             <a:endParaRPr lang="de-AT"/>
           </a:p>
@@ -2474,7 +2474,7 @@
           <a:p>
             <a:fld id="{ACE3B52F-493B-4126-A797-2AC36596430B}" type="datetimeFigureOut">
               <a:rPr lang="de-AT" smtClean="0"/>
-              <a:t>21.11.2017</a:t>
+              <a:t>22.11.2017</a:t>
             </a:fld>
             <a:endParaRPr lang="de-AT"/>
           </a:p>
@@ -2763,7 +2763,7 @@
           <a:p>
             <a:fld id="{ACE3B52F-493B-4126-A797-2AC36596430B}" type="datetimeFigureOut">
               <a:rPr lang="de-AT" smtClean="0"/>
-              <a:t>21.11.2017</a:t>
+              <a:t>22.11.2017</a:t>
             </a:fld>
             <a:endParaRPr lang="de-AT"/>
           </a:p>
@@ -3006,7 +3006,7 @@
           <a:p>
             <a:fld id="{ACE3B52F-493B-4126-A797-2AC36596430B}" type="datetimeFigureOut">
               <a:rPr lang="de-AT" smtClean="0"/>
-              <a:t>21.11.2017</a:t>
+              <a:t>22.11.2017</a:t>
             </a:fld>
             <a:endParaRPr lang="de-AT"/>
           </a:p>
@@ -4715,6 +4715,13 @@
             <a:pPr lvl="1"/>
             <a:r>
               <a:rPr lang="de-AT" dirty="0"/>
+              <a:t>Pedometer </a:t>
+            </a:r>
+          </a:p>
+          <a:p>
+            <a:pPr lvl="1"/>
+            <a:r>
+              <a:rPr lang="de-AT" dirty="0"/>
               <a:t>Huawei Health</a:t>
             </a:r>
           </a:p>
@@ -4727,10 +4734,7 @@
           </a:p>
           <a:p>
             <a:pPr lvl="1"/>
-            <a:r>
-              <a:rPr lang="de-AT" dirty="0"/>
-              <a:t>Pedometer</a:t>
-            </a:r>
+            <a:endParaRPr lang="de-AT" dirty="0"/>
           </a:p>
           <a:p>
             <a:endParaRPr lang="de-AT" dirty="0"/>
@@ -4751,7 +4755,7 @@
           </p:cNvPicPr>
           <p:nvPr/>
         </p:nvPicPr>
-        <p:blipFill>
+        <p:blipFill rotWithShape="1">
           <a:blip r:embed="rId2">
             <a:extLst>
               <a:ext uri="{28A0092B-C50C-407E-A947-70E740481C1C}">
@@ -4759,14 +4763,148 @@
               </a:ext>
             </a:extLst>
           </a:blip>
-          <a:stretch>
-            <a:fillRect/>
-          </a:stretch>
+          <a:srcRect t="36161"/>
+          <a:stretch/>
         </p:blipFill>
         <p:spPr>
           <a:xfrm>
-            <a:off x="5937782" y="3429000"/>
-            <a:ext cx="4543102" cy="2425233"/>
+            <a:off x="7464114" y="1388225"/>
+            <a:ext cx="3889686" cy="1325563"/>
+          </a:xfrm>
+          <a:prstGeom prst="rect">
+            <a:avLst/>
+          </a:prstGeom>
+          <a:ln>
+            <a:noFill/>
+          </a:ln>
+          <a:effectLst>
+            <a:outerShdw blurRad="292100" dist="139700" dir="2700000" algn="tl" rotWithShape="0">
+              <a:srgbClr val="333333">
+                <a:alpha val="65000"/>
+              </a:srgbClr>
+            </a:outerShdw>
+          </a:effectLst>
+        </p:spPr>
+      </p:pic>
+      <p:pic>
+        <p:nvPicPr>
+          <p:cNvPr id="5" name="Grafik 4">
+            <a:extLst>
+              <a:ext uri="{FF2B5EF4-FFF2-40B4-BE49-F238E27FC236}">
+                <a16:creationId xmlns:a16="http://schemas.microsoft.com/office/drawing/2014/main" id="{ED89D24B-3C68-4E58-AEFC-91453F46B45C}"/>
+              </a:ext>
+            </a:extLst>
+          </p:cNvPr>
+          <p:cNvPicPr>
+            <a:picLocks noChangeAspect="1"/>
+          </p:cNvPicPr>
+          <p:nvPr/>
+        </p:nvPicPr>
+        <p:blipFill rotWithShape="1">
+          <a:blip r:embed="rId3">
+            <a:extLst>
+              <a:ext uri="{28A0092B-C50C-407E-A947-70E740481C1C}">
+                <a14:useLocalDpi xmlns:a14="http://schemas.microsoft.com/office/drawing/2010/main" val="0"/>
+              </a:ext>
+            </a:extLst>
+          </a:blip>
+          <a:srcRect b="64636"/>
+          <a:stretch/>
+        </p:blipFill>
+        <p:spPr>
+          <a:xfrm>
+            <a:off x="4669153" y="4546575"/>
+            <a:ext cx="3094318" cy="1946300"/>
+          </a:xfrm>
+          <a:prstGeom prst="rect">
+            <a:avLst/>
+          </a:prstGeom>
+          <a:ln>
+            <a:noFill/>
+          </a:ln>
+          <a:effectLst>
+            <a:outerShdw blurRad="292100" dist="139700" dir="2700000" algn="tl" rotWithShape="0">
+              <a:srgbClr val="333333">
+                <a:alpha val="65000"/>
+              </a:srgbClr>
+            </a:outerShdw>
+          </a:effectLst>
+        </p:spPr>
+      </p:pic>
+      <p:pic>
+        <p:nvPicPr>
+          <p:cNvPr id="8" name="Grafik 7">
+            <a:extLst>
+              <a:ext uri="{FF2B5EF4-FFF2-40B4-BE49-F238E27FC236}">
+                <a16:creationId xmlns:a16="http://schemas.microsoft.com/office/drawing/2014/main" id="{5E5EFC15-18CD-41E6-AE2B-1BCFC6F86519}"/>
+              </a:ext>
+            </a:extLst>
+          </p:cNvPr>
+          <p:cNvPicPr>
+            <a:picLocks noChangeAspect="1"/>
+          </p:cNvPicPr>
+          <p:nvPr/>
+        </p:nvPicPr>
+        <p:blipFill rotWithShape="1">
+          <a:blip r:embed="rId4">
+            <a:extLst>
+              <a:ext uri="{28A0092B-C50C-407E-A947-70E740481C1C}">
+                <a14:useLocalDpi xmlns:a14="http://schemas.microsoft.com/office/drawing/2010/main" val="0"/>
+              </a:ext>
+            </a:extLst>
+          </a:blip>
+          <a:srcRect b="71151"/>
+          <a:stretch/>
+        </p:blipFill>
+        <p:spPr>
+          <a:xfrm>
+            <a:off x="919026" y="4552486"/>
+            <a:ext cx="3094318" cy="1587730"/>
+          </a:xfrm>
+          <a:prstGeom prst="rect">
+            <a:avLst/>
+          </a:prstGeom>
+          <a:ln>
+            <a:noFill/>
+          </a:ln>
+          <a:effectLst>
+            <a:outerShdw blurRad="292100" dist="139700" dir="2700000" algn="tl" rotWithShape="0">
+              <a:srgbClr val="333333">
+                <a:alpha val="65000"/>
+              </a:srgbClr>
+            </a:outerShdw>
+          </a:effectLst>
+        </p:spPr>
+      </p:pic>
+      <p:pic>
+        <p:nvPicPr>
+          <p:cNvPr id="10" name="Grafik 9">
+            <a:extLst>
+              <a:ext uri="{FF2B5EF4-FFF2-40B4-BE49-F238E27FC236}">
+                <a16:creationId xmlns:a16="http://schemas.microsoft.com/office/drawing/2014/main" id="{5E06AA78-E524-4807-8C5C-F3BBEF7DE6CF}"/>
+              </a:ext>
+            </a:extLst>
+          </p:cNvPr>
+          <p:cNvPicPr>
+            <a:picLocks noChangeAspect="1"/>
+          </p:cNvPicPr>
+          <p:nvPr/>
+        </p:nvPicPr>
+        <p:blipFill rotWithShape="1">
+          <a:blip r:embed="rId5">
+            <a:extLst>
+              <a:ext uri="{28A0092B-C50C-407E-A947-70E740481C1C}">
+                <a14:useLocalDpi xmlns:a14="http://schemas.microsoft.com/office/drawing/2010/main" val="0"/>
+              </a:ext>
+            </a:extLst>
+          </a:blip>
+          <a:srcRect b="66303"/>
+          <a:stretch/>
+        </p:blipFill>
+        <p:spPr>
+          <a:xfrm>
+            <a:off x="8419280" y="4546575"/>
+            <a:ext cx="3221986" cy="1931093"/>
           </a:xfrm>
           <a:prstGeom prst="rect">
             <a:avLst/>

</xml_diff>

<commit_message>
add screenshot of app ui
</commit_message>
<xml_diff>
--- a/Mountaineer.pptx
+++ b/Mountaineer.pptx
@@ -18,7 +18,8 @@
     <p:sldId id="270" r:id="rId12"/>
     <p:sldId id="271" r:id="rId13"/>
     <p:sldId id="272" r:id="rId14"/>
-    <p:sldId id="266" r:id="rId15"/>
+    <p:sldId id="274" r:id="rId15"/>
+    <p:sldId id="266" r:id="rId16"/>
   </p:sldIdLst>
   <p:sldSz cx="12192000" cy="6858000"/>
   <p:notesSz cx="6858000" cy="9144000"/>
@@ -3828,7 +3829,7 @@
           <a:effectLst>
             <a:outerShdw blurRad="127000" sx="102000" sy="102000" algn="ctr" rotWithShape="0">
               <a:prstClr val="black">
-                <a:alpha val="23000"/>
+                <a:alpha val="10000"/>
               </a:prstClr>
             </a:outerShdw>
           </a:effectLst>
@@ -4774,14 +4775,11 @@
           <a:prstGeom prst="rect">
             <a:avLst/>
           </a:prstGeom>
-          <a:ln>
-            <a:noFill/>
-          </a:ln>
           <a:effectLst>
-            <a:outerShdw blurRad="292100" dist="139700" dir="2700000" algn="tl" rotWithShape="0">
-              <a:srgbClr val="333333">
-                <a:alpha val="65000"/>
-              </a:srgbClr>
+            <a:outerShdw blurRad="127000" sx="102000" sy="102000" algn="ctr" rotWithShape="0">
+              <a:prstClr val="black">
+                <a:alpha val="10000"/>
+              </a:prstClr>
             </a:outerShdw>
           </a:effectLst>
         </p:spPr>
@@ -4819,14 +4817,11 @@
           <a:prstGeom prst="rect">
             <a:avLst/>
           </a:prstGeom>
-          <a:ln>
-            <a:noFill/>
-          </a:ln>
           <a:effectLst>
-            <a:outerShdw blurRad="292100" dist="139700" dir="2700000" algn="tl" rotWithShape="0">
-              <a:srgbClr val="333333">
-                <a:alpha val="65000"/>
-              </a:srgbClr>
+            <a:outerShdw blurRad="127000" sx="102000" sy="102000" algn="ctr" rotWithShape="0">
+              <a:prstClr val="black">
+                <a:alpha val="10000"/>
+              </a:prstClr>
             </a:outerShdw>
           </a:effectLst>
         </p:spPr>
@@ -4864,14 +4859,11 @@
           <a:prstGeom prst="rect">
             <a:avLst/>
           </a:prstGeom>
-          <a:ln>
-            <a:noFill/>
-          </a:ln>
           <a:effectLst>
-            <a:outerShdw blurRad="292100" dist="139700" dir="2700000" algn="tl" rotWithShape="0">
-              <a:srgbClr val="333333">
-                <a:alpha val="65000"/>
-              </a:srgbClr>
+            <a:outerShdw blurRad="127000" sx="102000" sy="102000" algn="ctr" rotWithShape="0">
+              <a:prstClr val="black">
+                <a:alpha val="10000"/>
+              </a:prstClr>
             </a:outerShdw>
           </a:effectLst>
         </p:spPr>
@@ -4909,14 +4901,11 @@
           <a:prstGeom prst="rect">
             <a:avLst/>
           </a:prstGeom>
-          <a:ln>
-            <a:noFill/>
-          </a:ln>
           <a:effectLst>
-            <a:outerShdw blurRad="292100" dist="139700" dir="2700000" algn="tl" rotWithShape="0">
-              <a:srgbClr val="333333">
-                <a:alpha val="65000"/>
-              </a:srgbClr>
+            <a:outerShdw blurRad="127000" sx="102000" sy="102000" algn="ctr" rotWithShape="0">
+              <a:prstClr val="black">
+                <a:alpha val="10000"/>
+              </a:prstClr>
             </a:outerShdw>
           </a:effectLst>
         </p:spPr>
@@ -4935,6 +4924,353 @@
 </file>
 
 <file path=ppt/slides/slide14.xml><?xml version="1.0" encoding="utf-8"?>
+<p:sld xmlns:a="http://schemas.openxmlformats.org/drawingml/2006/main" xmlns:r="http://schemas.openxmlformats.org/officeDocument/2006/relationships" xmlns:p="http://schemas.openxmlformats.org/presentationml/2006/main">
+  <p:cSld>
+    <p:spTree>
+      <p:nvGrpSpPr>
+        <p:cNvPr id="1" name=""/>
+        <p:cNvGrpSpPr/>
+        <p:nvPr/>
+      </p:nvGrpSpPr>
+      <p:grpSpPr>
+        <a:xfrm>
+          <a:off x="0" y="0"/>
+          <a:ext cx="0" cy="0"/>
+          <a:chOff x="0" y="0"/>
+          <a:chExt cx="0" cy="0"/>
+        </a:xfrm>
+      </p:grpSpPr>
+      <p:sp>
+        <p:nvSpPr>
+          <p:cNvPr id="2" name="Titel 1">
+            <a:extLst>
+              <a:ext uri="{FF2B5EF4-FFF2-40B4-BE49-F238E27FC236}">
+                <a16:creationId xmlns:a16="http://schemas.microsoft.com/office/drawing/2014/main" id="{432EFAA7-0B7A-477B-B2FA-57331202F701}"/>
+              </a:ext>
+            </a:extLst>
+          </p:cNvPr>
+          <p:cNvSpPr>
+            <a:spLocks noGrp="1"/>
+          </p:cNvSpPr>
+          <p:nvPr>
+            <p:ph type="title"/>
+          </p:nvPr>
+        </p:nvSpPr>
+        <p:spPr/>
+        <p:txBody>
+          <a:bodyPr/>
+          <a:lstStyle/>
+          <a:p>
+            <a:r>
+              <a:rPr lang="de-AT" dirty="0"/>
+              <a:t>UI </a:t>
+            </a:r>
+            <a:r>
+              <a:rPr lang="de-AT" dirty="0" err="1"/>
+              <a:t>is</a:t>
+            </a:r>
+            <a:r>
+              <a:rPr lang="de-AT" dirty="0"/>
+              <a:t> (</a:t>
+            </a:r>
+            <a:r>
+              <a:rPr lang="de-AT" dirty="0" err="1"/>
+              <a:t>almost</a:t>
+            </a:r>
+            <a:r>
+              <a:rPr lang="de-AT" dirty="0"/>
+              <a:t>) </a:t>
+            </a:r>
+            <a:r>
+              <a:rPr lang="de-AT" dirty="0" err="1"/>
+              <a:t>ready</a:t>
+            </a:r>
+            <a:endParaRPr lang="de-AT" dirty="0"/>
+          </a:p>
+        </p:txBody>
+      </p:sp>
+      <p:pic>
+        <p:nvPicPr>
+          <p:cNvPr id="5" name="Inhaltsplatzhalter 4">
+            <a:extLst>
+              <a:ext uri="{FF2B5EF4-FFF2-40B4-BE49-F238E27FC236}">
+                <a16:creationId xmlns:a16="http://schemas.microsoft.com/office/drawing/2014/main" id="{A63E0AA9-FE2D-4D98-B04E-401C2D4C2B77}"/>
+              </a:ext>
+            </a:extLst>
+          </p:cNvPr>
+          <p:cNvPicPr>
+            <a:picLocks noGrp="1" noChangeAspect="1"/>
+          </p:cNvPicPr>
+          <p:nvPr>
+            <p:ph idx="1"/>
+          </p:nvPr>
+        </p:nvPicPr>
+        <p:blipFill>
+          <a:blip r:embed="rId2">
+            <a:extLst>
+              <a:ext uri="{28A0092B-C50C-407E-A947-70E740481C1C}">
+                <a14:useLocalDpi xmlns:a14="http://schemas.microsoft.com/office/drawing/2010/main" val="0"/>
+              </a:ext>
+            </a:extLst>
+          </a:blip>
+          <a:stretch>
+            <a:fillRect/>
+          </a:stretch>
+        </p:blipFill>
+        <p:spPr>
+          <a:xfrm>
+            <a:off x="6997517" y="449379"/>
+            <a:ext cx="3350443" cy="5959242"/>
+          </a:xfrm>
+          <a:prstGeom prst="rect">
+            <a:avLst/>
+          </a:prstGeom>
+          <a:effectLst>
+            <a:outerShdw blurRad="127000" sx="102000" sy="102000" algn="ctr" rotWithShape="0">
+              <a:prstClr val="black">
+                <a:alpha val="10000"/>
+              </a:prstClr>
+            </a:outerShdw>
+          </a:effectLst>
+        </p:spPr>
+      </p:pic>
+      <p:sp>
+        <p:nvSpPr>
+          <p:cNvPr id="7" name="Inhaltsplatzhalter 2">
+            <a:extLst>
+              <a:ext uri="{FF2B5EF4-FFF2-40B4-BE49-F238E27FC236}">
+                <a16:creationId xmlns:a16="http://schemas.microsoft.com/office/drawing/2014/main" id="{DC206F93-26B0-459F-AF96-00AC525507D8}"/>
+              </a:ext>
+            </a:extLst>
+          </p:cNvPr>
+          <p:cNvSpPr txBox="1">
+            <a:spLocks/>
+          </p:cNvSpPr>
+          <p:nvPr/>
+        </p:nvSpPr>
+        <p:spPr>
+          <a:xfrm>
+            <a:off x="838200" y="1690688"/>
+            <a:ext cx="6797842" cy="4533611"/>
+          </a:xfrm>
+          <a:prstGeom prst="rect">
+            <a:avLst/>
+          </a:prstGeom>
+        </p:spPr>
+        <p:txBody>
+          <a:bodyPr vert="horz" lIns="91440" tIns="45720" rIns="91440" bIns="45720" rtlCol="0">
+            <a:normAutofit/>
+          </a:bodyPr>
+          <a:lstStyle>
+            <a:lvl1pPr marL="228600" indent="-228600" algn="l" defTabSz="914400" rtl="0" eaLnBrk="1" latinLnBrk="0" hangingPunct="1">
+              <a:lnSpc>
+                <a:spcPct val="90000"/>
+              </a:lnSpc>
+              <a:spcBef>
+                <a:spcPts val="1000"/>
+              </a:spcBef>
+              <a:buFont typeface="Arial" panose="020B0604020202020204" pitchFamily="34" charset="0"/>
+              <a:buChar char="•"/>
+              <a:defRPr sz="3200" kern="1200">
+                <a:solidFill>
+                  <a:srgbClr val="252525"/>
+                </a:solidFill>
+                <a:latin typeface="Roboto Light" panose="02000000000000000000" pitchFamily="2" charset="0"/>
+                <a:ea typeface="Roboto Light" panose="02000000000000000000" pitchFamily="2" charset="0"/>
+                <a:cs typeface="+mn-cs"/>
+              </a:defRPr>
+            </a:lvl1pPr>
+            <a:lvl2pPr marL="685800" indent="-228600" algn="l" defTabSz="914400" rtl="0" eaLnBrk="1" latinLnBrk="0" hangingPunct="1">
+              <a:lnSpc>
+                <a:spcPct val="90000"/>
+              </a:lnSpc>
+              <a:spcBef>
+                <a:spcPts val="500"/>
+              </a:spcBef>
+              <a:buFont typeface="Arial" panose="020B0604020202020204" pitchFamily="34" charset="0"/>
+              <a:buChar char="•"/>
+              <a:defRPr sz="2600" kern="1200">
+                <a:solidFill>
+                  <a:srgbClr val="252525"/>
+                </a:solidFill>
+                <a:latin typeface="Roboto Light" panose="02000000000000000000" pitchFamily="2" charset="0"/>
+                <a:ea typeface="Roboto Light" panose="02000000000000000000" pitchFamily="2" charset="0"/>
+                <a:cs typeface="+mn-cs"/>
+              </a:defRPr>
+            </a:lvl2pPr>
+            <a:lvl3pPr marL="1143000" indent="-228600" algn="l" defTabSz="914400" rtl="0" eaLnBrk="1" latinLnBrk="0" hangingPunct="1">
+              <a:lnSpc>
+                <a:spcPct val="90000"/>
+              </a:lnSpc>
+              <a:spcBef>
+                <a:spcPts val="500"/>
+              </a:spcBef>
+              <a:buFont typeface="Arial" panose="020B0604020202020204" pitchFamily="34" charset="0"/>
+              <a:buChar char="•"/>
+              <a:defRPr sz="2400" kern="1200">
+                <a:solidFill>
+                  <a:srgbClr val="252525"/>
+                </a:solidFill>
+                <a:latin typeface="Roboto Light" panose="02000000000000000000" pitchFamily="2" charset="0"/>
+                <a:ea typeface="Roboto Light" panose="02000000000000000000" pitchFamily="2" charset="0"/>
+                <a:cs typeface="+mn-cs"/>
+              </a:defRPr>
+            </a:lvl3pPr>
+            <a:lvl4pPr marL="1600200" indent="-228600" algn="l" defTabSz="914400" rtl="0" eaLnBrk="1" latinLnBrk="0" hangingPunct="1">
+              <a:lnSpc>
+                <a:spcPct val="90000"/>
+              </a:lnSpc>
+              <a:spcBef>
+                <a:spcPts val="500"/>
+              </a:spcBef>
+              <a:buFont typeface="Arial" panose="020B0604020202020204" pitchFamily="34" charset="0"/>
+              <a:buChar char="•"/>
+              <a:defRPr sz="2200" kern="1200">
+                <a:solidFill>
+                  <a:srgbClr val="252525"/>
+                </a:solidFill>
+                <a:latin typeface="Roboto Light" panose="02000000000000000000" pitchFamily="2" charset="0"/>
+                <a:ea typeface="Roboto Light" panose="02000000000000000000" pitchFamily="2" charset="0"/>
+                <a:cs typeface="+mn-cs"/>
+              </a:defRPr>
+            </a:lvl4pPr>
+            <a:lvl5pPr marL="2057400" indent="-228600" algn="l" defTabSz="914400" rtl="0" eaLnBrk="1" latinLnBrk="0" hangingPunct="1">
+              <a:lnSpc>
+                <a:spcPct val="90000"/>
+              </a:lnSpc>
+              <a:spcBef>
+                <a:spcPts val="500"/>
+              </a:spcBef>
+              <a:buFont typeface="Arial" panose="020B0604020202020204" pitchFamily="34" charset="0"/>
+              <a:buChar char="•"/>
+              <a:defRPr sz="2000" kern="1200">
+                <a:solidFill>
+                  <a:srgbClr val="252525"/>
+                </a:solidFill>
+                <a:latin typeface="Roboto Light" panose="02000000000000000000" pitchFamily="2" charset="0"/>
+                <a:ea typeface="Roboto Light" panose="02000000000000000000" pitchFamily="2" charset="0"/>
+                <a:cs typeface="+mn-cs"/>
+              </a:defRPr>
+            </a:lvl5pPr>
+            <a:lvl6pPr marL="2514600" indent="-228600" algn="l" defTabSz="914400" rtl="0" eaLnBrk="1" latinLnBrk="0" hangingPunct="1">
+              <a:lnSpc>
+                <a:spcPct val="90000"/>
+              </a:lnSpc>
+              <a:spcBef>
+                <a:spcPts val="500"/>
+              </a:spcBef>
+              <a:buFont typeface="Arial" panose="020B0604020202020204" pitchFamily="34" charset="0"/>
+              <a:buChar char="•"/>
+              <a:defRPr sz="1800" kern="1200">
+                <a:solidFill>
+                  <a:schemeClr val="tx1"/>
+                </a:solidFill>
+                <a:latin typeface="+mn-lt"/>
+                <a:ea typeface="+mn-ea"/>
+                <a:cs typeface="+mn-cs"/>
+              </a:defRPr>
+            </a:lvl6pPr>
+            <a:lvl7pPr marL="2971800" indent="-228600" algn="l" defTabSz="914400" rtl="0" eaLnBrk="1" latinLnBrk="0" hangingPunct="1">
+              <a:lnSpc>
+                <a:spcPct val="90000"/>
+              </a:lnSpc>
+              <a:spcBef>
+                <a:spcPts val="500"/>
+              </a:spcBef>
+              <a:buFont typeface="Arial" panose="020B0604020202020204" pitchFamily="34" charset="0"/>
+              <a:buChar char="•"/>
+              <a:defRPr sz="1800" kern="1200">
+                <a:solidFill>
+                  <a:schemeClr val="tx1"/>
+                </a:solidFill>
+                <a:latin typeface="+mn-lt"/>
+                <a:ea typeface="+mn-ea"/>
+                <a:cs typeface="+mn-cs"/>
+              </a:defRPr>
+            </a:lvl7pPr>
+            <a:lvl8pPr marL="3429000" indent="-228600" algn="l" defTabSz="914400" rtl="0" eaLnBrk="1" latinLnBrk="0" hangingPunct="1">
+              <a:lnSpc>
+                <a:spcPct val="90000"/>
+              </a:lnSpc>
+              <a:spcBef>
+                <a:spcPts val="500"/>
+              </a:spcBef>
+              <a:buFont typeface="Arial" panose="020B0604020202020204" pitchFamily="34" charset="0"/>
+              <a:buChar char="•"/>
+              <a:defRPr sz="1800" kern="1200">
+                <a:solidFill>
+                  <a:schemeClr val="tx1"/>
+                </a:solidFill>
+                <a:latin typeface="+mn-lt"/>
+                <a:ea typeface="+mn-ea"/>
+                <a:cs typeface="+mn-cs"/>
+              </a:defRPr>
+            </a:lvl8pPr>
+            <a:lvl9pPr marL="3886200" indent="-228600" algn="l" defTabSz="914400" rtl="0" eaLnBrk="1" latinLnBrk="0" hangingPunct="1">
+              <a:lnSpc>
+                <a:spcPct val="90000"/>
+              </a:lnSpc>
+              <a:spcBef>
+                <a:spcPts val="500"/>
+              </a:spcBef>
+              <a:buFont typeface="Arial" panose="020B0604020202020204" pitchFamily="34" charset="0"/>
+              <a:buChar char="•"/>
+              <a:defRPr sz="1800" kern="1200">
+                <a:solidFill>
+                  <a:schemeClr val="tx1"/>
+                </a:solidFill>
+                <a:latin typeface="+mn-lt"/>
+                <a:ea typeface="+mn-ea"/>
+                <a:cs typeface="+mn-cs"/>
+              </a:defRPr>
+            </a:lvl9pPr>
+          </a:lstStyle>
+          <a:p>
+            <a:pPr marL="0" indent="0">
+              <a:buNone/>
+            </a:pPr>
+            <a:r>
+              <a:rPr lang="de-AT" dirty="0"/>
+              <a:t>and </a:t>
+            </a:r>
+            <a:r>
+              <a:rPr lang="de-AT" dirty="0" err="1"/>
+              <a:t>waiting</a:t>
+            </a:r>
+            <a:r>
+              <a:rPr lang="de-AT" dirty="0"/>
+              <a:t> </a:t>
+            </a:r>
+            <a:r>
+              <a:rPr lang="de-AT" dirty="0" err="1"/>
+              <a:t>for</a:t>
+            </a:r>
+            <a:r>
+              <a:rPr lang="de-AT" dirty="0"/>
+              <a:t> </a:t>
+            </a:r>
+            <a:r>
+              <a:rPr lang="de-AT" dirty="0" err="1"/>
+              <a:t>functionality</a:t>
+            </a:r>
+            <a:endParaRPr lang="de-AT" dirty="0"/>
+          </a:p>
+        </p:txBody>
+      </p:sp>
+    </p:spTree>
+    <p:extLst>
+      <p:ext uri="{BB962C8B-B14F-4D97-AF65-F5344CB8AC3E}">
+        <p14:creationId xmlns:p14="http://schemas.microsoft.com/office/powerpoint/2010/main" val="3888662104"/>
+      </p:ext>
+    </p:extLst>
+  </p:cSld>
+  <p:clrMapOvr>
+    <a:masterClrMapping/>
+  </p:clrMapOvr>
+</p:sld>
+</file>
+
+<file path=ppt/slides/slide15.xml><?xml version="1.0" encoding="utf-8"?>
 <p:sld xmlns:a="http://schemas.openxmlformats.org/drawingml/2006/main" xmlns:r="http://schemas.openxmlformats.org/officeDocument/2006/relationships" xmlns:p="http://schemas.openxmlformats.org/presentationml/2006/main">
   <p:cSld>
     <p:spTree>

</xml_diff>

<commit_message>
update screenshot in presentation
</commit_message>
<xml_diff>
--- a/Mountaineer.pptx
+++ b/Mountaineer.pptx
@@ -4744,10 +4744,10 @@
       </p:sp>
       <p:pic>
         <p:nvPicPr>
-          <p:cNvPr id="6" name="Inhaltsplatzhalter 4">
-            <a:extLst>
-              <a:ext uri="{FF2B5EF4-FFF2-40B4-BE49-F238E27FC236}">
-                <a16:creationId xmlns:a16="http://schemas.microsoft.com/office/drawing/2014/main" id="{84AC9FBC-7AD1-456B-9447-7DBBB603D62A}"/>
+          <p:cNvPr id="5" name="Grafik 4">
+            <a:extLst>
+              <a:ext uri="{FF2B5EF4-FFF2-40B4-BE49-F238E27FC236}">
+                <a16:creationId xmlns:a16="http://schemas.microsoft.com/office/drawing/2014/main" id="{ED89D24B-3C68-4E58-AEFC-91453F46B45C}"/>
               </a:ext>
             </a:extLst>
           </p:cNvPr>
@@ -4758,48 +4758,6 @@
         </p:nvPicPr>
         <p:blipFill rotWithShape="1">
           <a:blip r:embed="rId2">
-            <a:extLst>
-              <a:ext uri="{28A0092B-C50C-407E-A947-70E740481C1C}">
-                <a14:useLocalDpi xmlns:a14="http://schemas.microsoft.com/office/drawing/2010/main" val="0"/>
-              </a:ext>
-            </a:extLst>
-          </a:blip>
-          <a:srcRect t="36161"/>
-          <a:stretch/>
-        </p:blipFill>
-        <p:spPr>
-          <a:xfrm>
-            <a:off x="7464114" y="1388225"/>
-            <a:ext cx="3889686" cy="1325563"/>
-          </a:xfrm>
-          <a:prstGeom prst="rect">
-            <a:avLst/>
-          </a:prstGeom>
-          <a:effectLst>
-            <a:outerShdw blurRad="127000" sx="102000" sy="102000" algn="ctr" rotWithShape="0">
-              <a:prstClr val="black">
-                <a:alpha val="10000"/>
-              </a:prstClr>
-            </a:outerShdw>
-          </a:effectLst>
-        </p:spPr>
-      </p:pic>
-      <p:pic>
-        <p:nvPicPr>
-          <p:cNvPr id="5" name="Grafik 4">
-            <a:extLst>
-              <a:ext uri="{FF2B5EF4-FFF2-40B4-BE49-F238E27FC236}">
-                <a16:creationId xmlns:a16="http://schemas.microsoft.com/office/drawing/2014/main" id="{ED89D24B-3C68-4E58-AEFC-91453F46B45C}"/>
-              </a:ext>
-            </a:extLst>
-          </p:cNvPr>
-          <p:cNvPicPr>
-            <a:picLocks noChangeAspect="1"/>
-          </p:cNvPicPr>
-          <p:nvPr/>
-        </p:nvPicPr>
-        <p:blipFill rotWithShape="1">
-          <a:blip r:embed="rId3">
             <a:extLst>
               <a:ext uri="{28A0092B-C50C-407E-A947-70E740481C1C}">
                 <a14:useLocalDpi xmlns:a14="http://schemas.microsoft.com/office/drawing/2010/main" val="0"/>
@@ -4841,7 +4799,7 @@
           <p:nvPr/>
         </p:nvPicPr>
         <p:blipFill rotWithShape="1">
-          <a:blip r:embed="rId4">
+          <a:blip r:embed="rId3">
             <a:extLst>
               <a:ext uri="{28A0092B-C50C-407E-A947-70E740481C1C}">
                 <a14:useLocalDpi xmlns:a14="http://schemas.microsoft.com/office/drawing/2010/main" val="0"/>
@@ -4883,7 +4841,7 @@
           <p:nvPr/>
         </p:nvPicPr>
         <p:blipFill rotWithShape="1">
-          <a:blip r:embed="rId5">
+          <a:blip r:embed="rId4">
             <a:extLst>
               <a:ext uri="{28A0092B-C50C-407E-A947-70E740481C1C}">
                 <a14:useLocalDpi xmlns:a14="http://schemas.microsoft.com/office/drawing/2010/main" val="0"/>
@@ -4897,6 +4855,48 @@
           <a:xfrm>
             <a:off x="8419280" y="4546575"/>
             <a:ext cx="3221986" cy="1931093"/>
+          </a:xfrm>
+          <a:prstGeom prst="rect">
+            <a:avLst/>
+          </a:prstGeom>
+          <a:effectLst>
+            <a:outerShdw blurRad="127000" sx="102000" sy="102000" algn="ctr" rotWithShape="0">
+              <a:prstClr val="black">
+                <a:alpha val="10000"/>
+              </a:prstClr>
+            </a:outerShdw>
+          </a:effectLst>
+        </p:spPr>
+      </p:pic>
+      <p:pic>
+        <p:nvPicPr>
+          <p:cNvPr id="7" name="Grafik 6">
+            <a:extLst>
+              <a:ext uri="{FF2B5EF4-FFF2-40B4-BE49-F238E27FC236}">
+                <a16:creationId xmlns:a16="http://schemas.microsoft.com/office/drawing/2014/main" id="{3D71A1D1-CFB6-464B-903F-E9E8152E4390}"/>
+              </a:ext>
+            </a:extLst>
+          </p:cNvPr>
+          <p:cNvPicPr>
+            <a:picLocks noChangeAspect="1"/>
+          </p:cNvPicPr>
+          <p:nvPr/>
+        </p:nvPicPr>
+        <p:blipFill rotWithShape="1">
+          <a:blip r:embed="rId5">
+            <a:extLst>
+              <a:ext uri="{28A0092B-C50C-407E-A947-70E740481C1C}">
+                <a14:useLocalDpi xmlns:a14="http://schemas.microsoft.com/office/drawing/2010/main" val="0"/>
+              </a:ext>
+            </a:extLst>
+          </a:blip>
+          <a:srcRect t="11902" b="70424"/>
+          <a:stretch/>
+        </p:blipFill>
+        <p:spPr>
+          <a:xfrm>
+            <a:off x="7422360" y="1933662"/>
+            <a:ext cx="4218906" cy="1325563"/>
           </a:xfrm>
           <a:prstGeom prst="rect">
             <a:avLst/>

</xml_diff>